<commit_message>
forms and package structure
</commit_message>
<xml_diff>
--- a/Study/05. Package Structure/Package Structure.pptx
+++ b/Study/05. Package Structure/Package Structure.pptx
@@ -838,7 +838,7 @@
           <a:p>
             <a:fld id="{B6FB7DCD-5BA3-48A2-BE8C-591555253DD2}" type="datetimeFigureOut">
               <a:rPr lang="ko-KR" altLang="en-US" smtClean="0"/>
-              <a:t>2020-06-28</a:t>
+              <a:t>2020-06-29</a:t>
             </a:fld>
             <a:endParaRPr lang="ko-KR" altLang="en-US"/>
           </a:p>
@@ -1089,7 +1089,7 @@
           <a:p>
             <a:fld id="{B6FB7DCD-5BA3-48A2-BE8C-591555253DD2}" type="datetimeFigureOut">
               <a:rPr lang="ko-KR" altLang="en-US" smtClean="0"/>
-              <a:t>2020-06-28</a:t>
+              <a:t>2020-06-29</a:t>
             </a:fld>
             <a:endParaRPr lang="ko-KR" altLang="en-US"/>
           </a:p>
@@ -1403,7 +1403,7 @@
           <a:p>
             <a:fld id="{B6FB7DCD-5BA3-48A2-BE8C-591555253DD2}" type="datetimeFigureOut">
               <a:rPr lang="ko-KR" altLang="en-US" smtClean="0"/>
-              <a:t>2020-06-28</a:t>
+              <a:t>2020-06-29</a:t>
             </a:fld>
             <a:endParaRPr lang="ko-KR" altLang="en-US"/>
           </a:p>
@@ -1744,7 +1744,7 @@
           <a:p>
             <a:fld id="{B6FB7DCD-5BA3-48A2-BE8C-591555253DD2}" type="datetimeFigureOut">
               <a:rPr lang="ko-KR" altLang="en-US" smtClean="0"/>
-              <a:t>2020-06-28</a:t>
+              <a:t>2020-06-29</a:t>
             </a:fld>
             <a:endParaRPr lang="ko-KR" altLang="en-US"/>
           </a:p>
@@ -2058,7 +2058,7 @@
           <a:p>
             <a:fld id="{B6FB7DCD-5BA3-48A2-BE8C-591555253DD2}" type="datetimeFigureOut">
               <a:rPr lang="ko-KR" altLang="en-US" smtClean="0"/>
-              <a:t>2020-06-28</a:t>
+              <a:t>2020-06-29</a:t>
             </a:fld>
             <a:endParaRPr lang="ko-KR" altLang="en-US"/>
           </a:p>
@@ -2451,7 +2451,7 @@
           <a:p>
             <a:fld id="{B6FB7DCD-5BA3-48A2-BE8C-591555253DD2}" type="datetimeFigureOut">
               <a:rPr lang="ko-KR" altLang="en-US" smtClean="0"/>
-              <a:t>2020-06-28</a:t>
+              <a:t>2020-06-29</a:t>
             </a:fld>
             <a:endParaRPr lang="ko-KR" altLang="en-US"/>
           </a:p>
@@ -2621,7 +2621,7 @@
           <a:p>
             <a:fld id="{B6FB7DCD-5BA3-48A2-BE8C-591555253DD2}" type="datetimeFigureOut">
               <a:rPr lang="ko-KR" altLang="en-US" smtClean="0"/>
-              <a:t>2020-06-28</a:t>
+              <a:t>2020-06-29</a:t>
             </a:fld>
             <a:endParaRPr lang="ko-KR" altLang="en-US"/>
           </a:p>
@@ -2801,7 +2801,7 @@
           <a:p>
             <a:fld id="{B6FB7DCD-5BA3-48A2-BE8C-591555253DD2}" type="datetimeFigureOut">
               <a:rPr lang="ko-KR" altLang="en-US" smtClean="0"/>
-              <a:t>2020-06-28</a:t>
+              <a:t>2020-06-29</a:t>
             </a:fld>
             <a:endParaRPr lang="ko-KR" altLang="en-US"/>
           </a:p>
@@ -2977,7 +2977,7 @@
           <a:p>
             <a:fld id="{B6FB7DCD-5BA3-48A2-BE8C-591555253DD2}" type="datetimeFigureOut">
               <a:rPr lang="ko-KR" altLang="en-US" smtClean="0"/>
-              <a:t>2020-06-28</a:t>
+              <a:t>2020-06-29</a:t>
             </a:fld>
             <a:endParaRPr lang="ko-KR" altLang="en-US"/>
           </a:p>
@@ -3224,7 +3224,7 @@
           <a:p>
             <a:fld id="{B6FB7DCD-5BA3-48A2-BE8C-591555253DD2}" type="datetimeFigureOut">
               <a:rPr lang="ko-KR" altLang="en-US" smtClean="0"/>
-              <a:t>2020-06-28</a:t>
+              <a:t>2020-06-29</a:t>
             </a:fld>
             <a:endParaRPr lang="ko-KR" altLang="en-US"/>
           </a:p>
@@ -3456,7 +3456,7 @@
           <a:p>
             <a:fld id="{B6FB7DCD-5BA3-48A2-BE8C-591555253DD2}" type="datetimeFigureOut">
               <a:rPr lang="ko-KR" altLang="en-US" smtClean="0"/>
-              <a:t>2020-06-28</a:t>
+              <a:t>2020-06-29</a:t>
             </a:fld>
             <a:endParaRPr lang="ko-KR" altLang="en-US"/>
           </a:p>
@@ -3830,7 +3830,7 @@
           <a:p>
             <a:fld id="{B6FB7DCD-5BA3-48A2-BE8C-591555253DD2}" type="datetimeFigureOut">
               <a:rPr lang="ko-KR" altLang="en-US" smtClean="0"/>
-              <a:t>2020-06-28</a:t>
+              <a:t>2020-06-29</a:t>
             </a:fld>
             <a:endParaRPr lang="ko-KR" altLang="en-US"/>
           </a:p>
@@ -3953,7 +3953,7 @@
           <a:p>
             <a:fld id="{B6FB7DCD-5BA3-48A2-BE8C-591555253DD2}" type="datetimeFigureOut">
               <a:rPr lang="ko-KR" altLang="en-US" smtClean="0"/>
-              <a:t>2020-06-28</a:t>
+              <a:t>2020-06-29</a:t>
             </a:fld>
             <a:endParaRPr lang="ko-KR" altLang="en-US"/>
           </a:p>
@@ -4048,7 +4048,7 @@
           <a:p>
             <a:fld id="{B6FB7DCD-5BA3-48A2-BE8C-591555253DD2}" type="datetimeFigureOut">
               <a:rPr lang="ko-KR" altLang="en-US" smtClean="0"/>
-              <a:t>2020-06-28</a:t>
+              <a:t>2020-06-29</a:t>
             </a:fld>
             <a:endParaRPr lang="ko-KR" altLang="en-US"/>
           </a:p>
@@ -4303,7 +4303,7 @@
           <a:p>
             <a:fld id="{B6FB7DCD-5BA3-48A2-BE8C-591555253DD2}" type="datetimeFigureOut">
               <a:rPr lang="ko-KR" altLang="en-US" smtClean="0"/>
-              <a:t>2020-06-28</a:t>
+              <a:t>2020-06-29</a:t>
             </a:fld>
             <a:endParaRPr lang="ko-KR" altLang="en-US"/>
           </a:p>
@@ -4566,7 +4566,7 @@
           <a:p>
             <a:fld id="{B6FB7DCD-5BA3-48A2-BE8C-591555253DD2}" type="datetimeFigureOut">
               <a:rPr lang="ko-KR" altLang="en-US" smtClean="0"/>
-              <a:t>2020-06-28</a:t>
+              <a:t>2020-06-29</a:t>
             </a:fld>
             <a:endParaRPr lang="ko-KR" altLang="en-US"/>
           </a:p>
@@ -5309,7 +5309,7 @@
           <a:p>
             <a:fld id="{B6FB7DCD-5BA3-48A2-BE8C-591555253DD2}" type="datetimeFigureOut">
               <a:rPr lang="ko-KR" altLang="en-US" smtClean="0"/>
-              <a:t>2020-06-28</a:t>
+              <a:t>2020-06-29</a:t>
             </a:fld>
             <a:endParaRPr lang="ko-KR" altLang="en-US"/>
           </a:p>

</xml_diff>